<commit_message>
adding entire ds repo
</commit_message>
<xml_diff>
--- a/foundations_of_machine_learning/DS-3001/05_ML_Concepts_II_Data_Prep/machine_learning_bootcamp.pptx
+++ b/foundations_of_machine_learning/DS-3001/05_ML_Concepts_II_Data_Prep/machine_learning_bootcamp.pptx
@@ -272,7 +272,7 @@
           <a:p>
             <a:fld id="{27160A0F-9B86-4581-85D6-AE4500F6A801}" type="datetimeFigureOut">
               <a:rPr lang="en-US" smtClean="0"/>
-              <a:t>2/21/2022</a:t>
+              <a:t>9/18/2023</a:t>
             </a:fld>
             <a:endParaRPr lang="en-US"/>
           </a:p>
@@ -498,7 +498,7 @@
           <a:p>
             <a:fld id="{27BE458A-CC06-48BE-991B-B3ACDD14B597}" type="datetimeFigureOut">
               <a:rPr lang="en-US" smtClean="0"/>
-              <a:t>2/21/2022</a:t>
+              <a:t>9/18/2023</a:t>
             </a:fld>
             <a:endParaRPr lang="en-US"/>
           </a:p>
@@ -2108,7 +2108,7 @@
           <a:p>
             <a:fld id="{04C01D68-98F0-4413-A543-950947CC53F4}" type="datetime1">
               <a:rPr lang="en-US" smtClean="0"/>
-              <a:t>2/21/2022</a:t>
+              <a:t>9/18/2023</a:t>
             </a:fld>
             <a:endParaRPr lang="en-US"/>
           </a:p>
@@ -2265,7 +2265,7 @@
           <a:p>
             <a:fld id="{F5166586-FB24-4278-9591-82C4BBCDCA89}" type="datetime1">
               <a:rPr lang="en-US" smtClean="0"/>
-              <a:t>2/21/2022</a:t>
+              <a:t>9/18/2023</a:t>
             </a:fld>
             <a:endParaRPr lang="en-US"/>
           </a:p>
@@ -2459,7 +2459,7 @@
           <a:p>
             <a:fld id="{D5A5CA0D-3537-42D6-B0CE-3FBC0D012150}" type="datetime1">
               <a:rPr lang="en-US" smtClean="0"/>
-              <a:t>2/21/2022</a:t>
+              <a:t>9/18/2023</a:t>
             </a:fld>
             <a:endParaRPr lang="en-US"/>
           </a:p>
@@ -3514,7 +3514,7 @@
           <a:p>
             <a:fld id="{FDB3EDF1-F613-4DA2-A80A-754A6940B2FC}" type="datetime1">
               <a:rPr lang="en-US" smtClean="0"/>
-              <a:t>2/21/2022</a:t>
+              <a:t>9/18/2023</a:t>
             </a:fld>
             <a:endParaRPr lang="en-US"/>
           </a:p>
@@ -3759,7 +3759,7 @@
           <a:p>
             <a:fld id="{FD3B0033-72B4-4535-88FF-3AD028C99723}" type="datetime1">
               <a:rPr lang="en-US" smtClean="0"/>
-              <a:t>2/21/2022</a:t>
+              <a:t>9/18/2023</a:t>
             </a:fld>
             <a:endParaRPr lang="en-US"/>
           </a:p>
@@ -4139,7 +4139,7 @@
           <a:p>
             <a:fld id="{96B2EC89-E834-484E-B15B-8A782CBE7E42}" type="datetime1">
               <a:rPr lang="en-US" smtClean="0"/>
-              <a:t>2/21/2022</a:t>
+              <a:t>9/18/2023</a:t>
             </a:fld>
             <a:endParaRPr lang="en-US"/>
           </a:p>
@@ -4272,7 +4272,7 @@
           <a:p>
             <a:fld id="{B0BFDB64-FBD6-4851-B5A5-2376FDD55407}" type="datetime1">
               <a:rPr lang="en-US" smtClean="0"/>
-              <a:t>2/21/2022</a:t>
+              <a:t>9/18/2023</a:t>
             </a:fld>
             <a:endParaRPr lang="en-US"/>
           </a:p>
@@ -4383,7 +4383,7 @@
           <a:p>
             <a:fld id="{A796691A-4010-4E41-AAA5-8BA8423BEAFA}" type="datetime1">
               <a:rPr lang="en-US" smtClean="0"/>
-              <a:t>2/21/2022</a:t>
+              <a:t>9/18/2023</a:t>
             </a:fld>
             <a:endParaRPr lang="en-US"/>
           </a:p>
@@ -4674,7 +4674,7 @@
           <a:p>
             <a:fld id="{19A26292-8CED-46F0-BBB1-1BA0D2A33D09}" type="datetime1">
               <a:rPr lang="en-US" smtClean="0"/>
-              <a:t>2/21/2022</a:t>
+              <a:t>9/18/2023</a:t>
             </a:fld>
             <a:endParaRPr lang="en-US"/>
           </a:p>
@@ -4942,7 +4942,7 @@
           <a:p>
             <a:fld id="{961AD9AB-7BFD-44AF-B1FE-05602162B8C3}" type="datetime1">
               <a:rPr lang="en-US" smtClean="0"/>
-              <a:t>2/21/2022</a:t>
+              <a:t>9/18/2023</a:t>
             </a:fld>
             <a:endParaRPr lang="en-US"/>
           </a:p>
@@ -5169,7 +5169,7 @@
           <a:p>
             <a:fld id="{475570EF-A0EC-4C7C-9082-FFE56C4913AF}" type="datetime1">
               <a:rPr lang="en-US" smtClean="0"/>
-              <a:t>2/21/2022</a:t>
+              <a:t>9/18/2023</a:t>
             </a:fld>
             <a:endParaRPr lang="en-US"/>
           </a:p>
@@ -18572,68 +18572,13 @@
         </p:spPr>
         <p:txBody>
           <a:bodyPr>
-            <a:normAutofit lnSpcReduction="10000"/>
+            <a:normAutofit/>
           </a:bodyPr>
           <a:lstStyle/>
           <a:p>
             <a:r>
               <a:rPr lang="en-US" dirty="0"/>
-              <a:t> Variable Types and Data Types</a:t>
-            </a:r>
-          </a:p>
-          <a:p>
-            <a:pPr lvl="1"/>
-            <a:r>
-              <a:rPr lang="en-US" dirty="0"/>
-              <a:t>  Five Atomic Variable Types in R</a:t>
-            </a:r>
-          </a:p>
-          <a:p>
-            <a:pPr lvl="2"/>
-            <a:r>
-              <a:rPr lang="en-US" sz="2400" dirty="0"/>
-              <a:t> Numeric – number unlimited size</a:t>
-            </a:r>
-          </a:p>
-          <a:p>
-            <a:pPr lvl="2"/>
-            <a:r>
-              <a:rPr lang="en-US" sz="2400" dirty="0"/>
-              <a:t> Integer – number with constraints on size  </a:t>
-            </a:r>
-          </a:p>
-          <a:p>
-            <a:pPr lvl="2"/>
-            <a:r>
-              <a:rPr lang="en-US" sz="2400" dirty="0"/>
-              <a:t> Complex – numbers and characters</a:t>
-            </a:r>
-          </a:p>
-          <a:p>
-            <a:pPr lvl="2"/>
-            <a:r>
-              <a:rPr lang="en-US" sz="2400" dirty="0"/>
-              <a:t> Character – words</a:t>
-            </a:r>
-          </a:p>
-          <a:p>
-            <a:pPr lvl="2"/>
-            <a:r>
-              <a:rPr lang="en-US" sz="2400" dirty="0"/>
-              <a:t> Factor – unique character class that is limited in the number of categories</a:t>
-            </a:r>
-          </a:p>
-          <a:p>
-            <a:pPr lvl="2"/>
-            <a:r>
-              <a:rPr lang="en-US" sz="2400" dirty="0"/>
-              <a:t> Logical – True or False </a:t>
-            </a:r>
-          </a:p>
-          <a:p>
-            <a:r>
-              <a:rPr lang="en-US" dirty="0"/>
-              <a:t> Data Types </a:t>
+              <a:t> Variable Types</a:t>
             </a:r>
           </a:p>
           <a:p>
@@ -18646,9 +18591,19 @@
               <a:rPr lang="en-US" dirty="0">
                 <a:effectLst/>
               </a:rPr>
-              <a:t>A list is an R-object containing different types of elements inside it like vectors, functions, and even another list inside it.</a:t>
-            </a:r>
-            <a:endParaRPr lang="en-US" sz="3200" dirty="0"/>
+              <a:t>A list is </a:t>
+            </a:r>
+            <a:r>
+              <a:rPr lang="en-US" dirty="0"/>
+              <a:t>an object </a:t>
+            </a:r>
+            <a:r>
+              <a:rPr lang="en-US" dirty="0">
+                <a:effectLst/>
+              </a:rPr>
+              <a:t>containing different types of elements inside it like vectors, functions, and even another list inside it.</a:t>
+            </a:r>
+            <a:endParaRPr lang="en-US" sz="2800" dirty="0"/>
           </a:p>
           <a:p>
             <a:pPr lvl="1"/>
@@ -18664,7 +18619,7 @@
             </a:r>
             <a:r>
               <a:rPr lang="en-US" dirty="0"/>
-              <a:t> in R is a series of data items of the same basic type (from above)</a:t>
+              <a:t> is a series of data items of the same basic type (from above)</a:t>
             </a:r>
           </a:p>
           <a:p>
@@ -18852,46 +18807,56 @@
           <a:p>
             <a:r>
               <a:rPr lang="en-US" dirty="0"/>
-              <a:t> Some useful variable and data type  </a:t>
+              <a:t> Some useful variable and data type, these are pandas functions </a:t>
             </a:r>
           </a:p>
           <a:p>
             <a:pPr lvl="1"/>
             <a:r>
               <a:rPr lang="en-US" dirty="0"/>
-              <a:t> str()</a:t>
+              <a:t> x.info()</a:t>
             </a:r>
           </a:p>
           <a:p>
             <a:pPr lvl="1"/>
             <a:r>
               <a:rPr lang="en-US" dirty="0"/>
-              <a:t> class()</a:t>
+              <a:t> </a:t>
+            </a:r>
+            <a:r>
+              <a:rPr lang="en-US" dirty="0" err="1"/>
+              <a:t>x.dtypes</a:t>
+            </a:r>
+            <a:r>
+              <a:rPr lang="en-US" dirty="0"/>
+              <a:t>()</a:t>
             </a:r>
           </a:p>
           <a:p>
             <a:pPr lvl="1"/>
             <a:r>
               <a:rPr lang="en-US" dirty="0"/>
-              <a:t> names()</a:t>
+              <a:t> </a:t>
+            </a:r>
+            <a:r>
+              <a:rPr lang="en-US" dirty="0" err="1"/>
+              <a:t>x.shape</a:t>
+            </a:r>
+            <a:r>
+              <a:rPr lang="en-US" dirty="0"/>
+              <a:t>()</a:t>
             </a:r>
           </a:p>
           <a:p>
             <a:pPr lvl="1"/>
             <a:r>
               <a:rPr lang="en-US" dirty="0"/>
-              <a:t> length()</a:t>
-            </a:r>
-          </a:p>
-          <a:p>
-            <a:pPr lvl="1"/>
-            <a:r>
-              <a:rPr lang="en-US" dirty="0"/>
-              <a:t> dim()</a:t>
-            </a:r>
-          </a:p>
-          <a:p>
-            <a:pPr lvl="1"/>
+              <a:t> </a:t>
+            </a:r>
+            <a:r>
+              <a:rPr lang="en-US" dirty="0" err="1"/>
+              <a:t>x.describe</a:t>
+            </a:r>
             <a:endParaRPr lang="en-US" dirty="0"/>
           </a:p>
           <a:p>
@@ -18900,23 +18865,30 @@
             </a:pPr>
             <a:r>
               <a:rPr lang="en-US" dirty="0"/>
+              <a:t> </a:t>
+            </a:r>
+          </a:p>
+          <a:p>
+            <a:pPr marL="457200" lvl="1" indent="0">
+              <a:buNone/>
+            </a:pPr>
+            <a:endParaRPr lang="en-US" dirty="0"/>
+          </a:p>
+          <a:p>
+            <a:pPr marL="457200" lvl="1" indent="0">
+              <a:buNone/>
+            </a:pPr>
+            <a:r>
+              <a:rPr lang="en-US" dirty="0"/>
               <a:t>Open up </a:t>
             </a:r>
             <a:r>
               <a:rPr lang="en-US" dirty="0" err="1"/>
-              <a:t>Rstudio</a:t>
+              <a:t>VScode</a:t>
             </a:r>
             <a:r>
               <a:rPr lang="en-US" dirty="0"/>
-              <a:t> and try these functions out on the </a:t>
-            </a:r>
-            <a:r>
-              <a:rPr lang="en-US" dirty="0" err="1"/>
-              <a:t>mtcars</a:t>
-            </a:r>
-            <a:r>
-              <a:rPr lang="en-US" dirty="0"/>
-              <a:t> dataset. See if you agree with the output. </a:t>
+              <a:t> and try these functions out on the any dataset, just to get used to the output and how it can be used. </a:t>
             </a:r>
           </a:p>
           <a:p>
@@ -19060,25 +19032,6 @@
             </a:r>
           </a:p>
           <a:p>
-            <a:pPr lvl="1"/>
-            <a:endParaRPr lang="en-US" dirty="0"/>
-          </a:p>
-          <a:p>
-            <a:pPr lvl="1"/>
-            <a:r>
-              <a:rPr lang="en-US" dirty="0"/>
-              <a:t> Using </a:t>
-            </a:r>
-            <a:r>
-              <a:rPr lang="en-US" dirty="0" err="1"/>
-              <a:t>mtcars</a:t>
-            </a:r>
-            <a:r>
-              <a:rPr lang="en-US" dirty="0"/>
-              <a:t> again, what is the prevalence of vs variable? </a:t>
-            </a:r>
-          </a:p>
-          <a:p>
             <a:pPr marL="0" indent="0">
               <a:buNone/>
             </a:pPr>
@@ -19234,42 +19187,6 @@
             </a:pPr>
             <a:endParaRPr lang="en-US" dirty="0"/>
           </a:p>
-          <a:p>
-            <a:r>
-              <a:rPr lang="en-US" dirty="0"/>
-              <a:t> Use the minmax scaling function in the </a:t>
-            </a:r>
-            <a:r>
-              <a:rPr lang="en-US" dirty="0" err="1"/>
-              <a:t>gradDescent</a:t>
-            </a:r>
-            <a:r>
-              <a:rPr lang="en-US" dirty="0"/>
-              <a:t> package and scale the </a:t>
-            </a:r>
-            <a:r>
-              <a:rPr lang="en-US" dirty="0" err="1"/>
-              <a:t>mtcars</a:t>
-            </a:r>
-            <a:r>
-              <a:rPr lang="en-US" dirty="0"/>
-              <a:t> dataset setting the results to a new object. What happens? What class is the object? Can you view the </a:t>
-            </a:r>
-            <a:r>
-              <a:rPr lang="en-US" dirty="0" err="1"/>
-              <a:t>data.frame</a:t>
-            </a:r>
-            <a:r>
-              <a:rPr lang="en-US" dirty="0"/>
-              <a:t>?  </a:t>
-            </a:r>
-          </a:p>
-          <a:p>
-            <a:pPr marL="0" indent="0">
-              <a:buNone/>
-            </a:pPr>
-            <a:endParaRPr lang="en-US" dirty="0"/>
-          </a:p>
         </p:txBody>
       </p:sp>
       <p:sp>
@@ -19404,11 +19321,11 @@
             <a:pPr lvl="1"/>
             <a:r>
               <a:rPr lang="en-US" dirty="0"/>
-              <a:t> R comes with several functions/packages that handle missing data we are going to focus on the MICE package. </a:t>
-            </a:r>
-          </a:p>
-          <a:p>
-            <a:pPr lvl="2"/>
+              <a:t> Python comes with several functions/packages that handle missing data </a:t>
+            </a:r>
+          </a:p>
+          <a:p>
+            <a:pPr lvl="1"/>
             <a:r>
               <a:rPr lang="en-US" dirty="0"/>
               <a:t> First you need to try to detect if there are patterns of missing data, is it random or not. If you detect patterns than you have to develop a strategy to deal with that issue. </a:t>
@@ -19432,7 +19349,7 @@
             <a:pPr lvl="2"/>
             <a:r>
               <a:rPr lang="en-US" dirty="0"/>
-              <a:t> Start with the summary() function on a data frame </a:t>
+              <a:t> Start with the info() function on a data frame </a:t>
             </a:r>
           </a:p>
           <a:p>
@@ -19454,29 +19371,7 @@
             <a:pPr lvl="3"/>
             <a:r>
               <a:rPr lang="en-US" dirty="0"/>
-              <a:t> Generally variables with more the about 5% missing values should be deleted or imputation needs to occur </a:t>
-            </a:r>
-          </a:p>
-          <a:p>
-            <a:pPr lvl="4"/>
-            <a:r>
-              <a:rPr lang="en-US" dirty="0"/>
-              <a:t> Dig a little deeper and use the </a:t>
-            </a:r>
-            <a:r>
-              <a:rPr lang="en-US" dirty="0" err="1"/>
-              <a:t>md.pattern</a:t>
-            </a:r>
-            <a:r>
-              <a:rPr lang="en-US" dirty="0"/>
-              <a:t>() function in the Mice package. </a:t>
-            </a:r>
-          </a:p>
-          <a:p>
-            <a:pPr lvl="4"/>
-            <a:r>
-              <a:rPr lang="en-US" dirty="0"/>
-              <a:t> Since there doesn’t appear to be a pattern we will use complete cases to remove the NAs. </a:t>
+              <a:t> Generally variables with more the about 5%-10% missing values should be deleted or imputation needs to occur </a:t>
             </a:r>
           </a:p>
           <a:p>
@@ -21782,7 +21677,7 @@
 </file>
 
 <file path=ppt/slides/slide40.xml><?xml version="1.0" encoding="utf-8"?>
-<p:sld xmlns:a="http://schemas.openxmlformats.org/drawingml/2006/main" xmlns:r="http://schemas.openxmlformats.org/officeDocument/2006/relationships" xmlns:p="http://schemas.openxmlformats.org/presentationml/2006/main">
+<p:sld xmlns:a="http://schemas.openxmlformats.org/drawingml/2006/main" xmlns:r="http://schemas.openxmlformats.org/officeDocument/2006/relationships" xmlns:p="http://schemas.openxmlformats.org/presentationml/2006/main" show="0">
   <p:cSld>
     <p:spTree>
       <p:nvGrpSpPr>
@@ -21862,131 +21757,155 @@
           <a:p>
             <a:pPr lvl="1"/>
             <a:r>
+              <a:rPr lang="en-US" dirty="0"/>
+              <a:t>We can use pandas functions to help understand the missing data </a:t>
+            </a:r>
+          </a:p>
+          <a:p>
+            <a:pPr lvl="2"/>
+            <a:r>
+              <a:rPr lang="en-US" dirty="0"/>
+              <a:t> </a:t>
+            </a:r>
+            <a:r>
               <a:rPr lang="en-US" dirty="0" err="1"/>
-              <a:t>Complete.cases</a:t>
+              <a:t>x.isna</a:t>
             </a:r>
             <a:r>
               <a:rPr lang="en-US" dirty="0"/>
-              <a:t>() function creates a index to remove missing values </a:t>
+              <a:t>()</a:t>
             </a:r>
           </a:p>
           <a:p>
             <a:pPr lvl="2"/>
             <a:r>
+              <a:rPr lang="en-US" dirty="0" err="1"/>
+              <a:t>x.notna</a:t>
+            </a:r>
+            <a:r>
               <a:rPr lang="en-US" dirty="0"/>
-              <a:t>remove missing values from a vector </a:t>
+              <a:t>()</a:t>
+            </a:r>
+          </a:p>
+          <a:p>
+            <a:pPr lvl="2"/>
+            <a:endParaRPr lang="en-US" dirty="0"/>
+          </a:p>
+          <a:p>
+            <a:pPr lvl="1"/>
+            <a:r>
+              <a:rPr lang="en-US" dirty="0"/>
+              <a:t> We can also use search functions (</a:t>
+            </a:r>
+            <a:r>
+              <a:rPr lang="en-US" dirty="0" err="1"/>
+              <a:t>iloc,loc</a:t>
+            </a:r>
+            <a:r>
+              <a:rPr lang="en-US" dirty="0"/>
+              <a:t>, etc.) in combination with the above indexing functions to locate and remove </a:t>
+            </a:r>
+            <a:r>
+              <a:rPr lang="en-US" dirty="0" err="1"/>
+              <a:t>nas</a:t>
+            </a:r>
+            <a:r>
+              <a:rPr lang="en-US" dirty="0"/>
+              <a:t>, what is the code below doing? </a:t>
+            </a:r>
+          </a:p>
+          <a:p>
+            <a:pPr lvl="2"/>
+            <a:r>
+              <a:rPr lang="en-US" dirty="0"/>
+              <a:t> </a:t>
+            </a:r>
+            <a:r>
+              <a:rPr lang="en-US" b="0" dirty="0" err="1">
+                <a:solidFill>
+                  <a:srgbClr val="C6C6C6"/>
+                </a:solidFill>
+                <a:effectLst/>
+                <a:latin typeface="Consolas" panose="020B0609020204030204" pitchFamily="49" charset="0"/>
+              </a:rPr>
+              <a:t>x.loc</a:t>
+            </a:r>
+            <a:r>
+              <a:rPr lang="en-US" b="0" dirty="0">
+                <a:solidFill>
+                  <a:srgbClr val="C6C6C6"/>
+                </a:solidFill>
+                <a:effectLst/>
+                <a:latin typeface="Consolas" panose="020B0609020204030204" pitchFamily="49" charset="0"/>
+              </a:rPr>
+              <a:t>[</a:t>
+            </a:r>
+            <a:r>
+              <a:rPr lang="en-US" b="0" dirty="0" err="1">
+                <a:solidFill>
+                  <a:srgbClr val="C6C6C6"/>
+                </a:solidFill>
+                <a:effectLst/>
+                <a:latin typeface="Consolas" panose="020B0609020204030204" pitchFamily="49" charset="0"/>
+              </a:rPr>
+              <a:t>x.notna</a:t>
+            </a:r>
+            <a:r>
+              <a:rPr lang="en-US" b="0" dirty="0">
+                <a:solidFill>
+                  <a:srgbClr val="C6C6C6"/>
+                </a:solidFill>
+                <a:effectLst/>
+                <a:latin typeface="Consolas" panose="020B0609020204030204" pitchFamily="49" charset="0"/>
+              </a:rPr>
+              <a:t>().all(</a:t>
+            </a:r>
+            <a:r>
+              <a:rPr lang="en-US" b="0" dirty="0">
+                <a:solidFill>
+                  <a:srgbClr val="E99C42"/>
+                </a:solidFill>
+                <a:effectLst/>
+                <a:latin typeface="Consolas" panose="020B0609020204030204" pitchFamily="49" charset="0"/>
+              </a:rPr>
+              <a:t>axis</a:t>
+            </a:r>
+            <a:r>
+              <a:rPr lang="en-US" b="0" dirty="0">
+                <a:solidFill>
+                  <a:srgbClr val="E8364F"/>
+                </a:solidFill>
+                <a:effectLst/>
+                <a:latin typeface="Consolas" panose="020B0609020204030204" pitchFamily="49" charset="0"/>
+              </a:rPr>
+              <a:t>=</a:t>
+            </a:r>
+            <a:r>
+              <a:rPr lang="en-US" b="0" dirty="0">
+                <a:solidFill>
+                  <a:srgbClr val="D3C970"/>
+                </a:solidFill>
+                <a:effectLst/>
+                <a:latin typeface="Consolas" panose="020B0609020204030204" pitchFamily="49" charset="0"/>
+              </a:rPr>
+              <a:t>'columns’</a:t>
+            </a:r>
+            <a:r>
+              <a:rPr lang="en-US" b="0" dirty="0">
+                <a:solidFill>
+                  <a:srgbClr val="C6C6C6"/>
+                </a:solidFill>
+                <a:effectLst/>
+                <a:latin typeface="Consolas" panose="020B0609020204030204" pitchFamily="49" charset="0"/>
+              </a:rPr>
+              <a:t>)]</a:t>
             </a:r>
           </a:p>
           <a:p>
             <a:pPr marL="914400" lvl="2" indent="0">
               <a:buNone/>
             </a:pPr>
-            <a:r>
-              <a:rPr lang="en-US" dirty="0"/>
-              <a:t>	x &lt;- x[</a:t>
-            </a:r>
-            <a:r>
-              <a:rPr lang="en-US" dirty="0" err="1"/>
-              <a:t>complete.cases</a:t>
-            </a:r>
-            <a:r>
-              <a:rPr lang="en-US" dirty="0"/>
-              <a:t>(x)]</a:t>
-            </a:r>
-          </a:p>
-          <a:p>
-            <a:pPr lvl="2"/>
-            <a:r>
-              <a:rPr lang="en-US" dirty="0"/>
-              <a:t> remove from a </a:t>
-            </a:r>
-            <a:r>
-              <a:rPr lang="en-US" dirty="0" err="1"/>
-              <a:t>data.frame</a:t>
-            </a:r>
-            <a:r>
-              <a:rPr lang="en-US" dirty="0"/>
-              <a:t> </a:t>
-            </a:r>
-          </a:p>
-          <a:p>
-            <a:pPr marL="914400" lvl="2" indent="0">
-              <a:buNone/>
-            </a:pPr>
-            <a:r>
-              <a:rPr lang="en-US" dirty="0"/>
-              <a:t>	df &lt;- df[</a:t>
-            </a:r>
-            <a:r>
-              <a:rPr lang="en-US" dirty="0" err="1"/>
-              <a:t>complete.cases</a:t>
-            </a:r>
-            <a:r>
-              <a:rPr lang="en-US" dirty="0"/>
-              <a:t>(df), ]</a:t>
-            </a:r>
-          </a:p>
-          <a:p>
-            <a:pPr lvl="2"/>
-            <a:r>
-              <a:rPr lang="en-US" dirty="0"/>
-              <a:t> remove from individual rows </a:t>
-            </a:r>
-          </a:p>
-          <a:p>
-            <a:pPr marL="914400" lvl="2" indent="0">
-              <a:buNone/>
-            </a:pPr>
-            <a:r>
-              <a:rPr lang="en-US" dirty="0"/>
-              <a:t>	df &lt;- df[</a:t>
-            </a:r>
-            <a:r>
-              <a:rPr lang="en-US" dirty="0" err="1"/>
-              <a:t>complete.cases</a:t>
-            </a:r>
-            <a:r>
-              <a:rPr lang="en-US" dirty="0"/>
-              <a:t>(df[ , c(row1, row2, ….)]), ]</a:t>
-            </a:r>
-          </a:p>
-          <a:p>
-            <a:pPr marL="457200" lvl="1" indent="0">
-              <a:buNone/>
-            </a:pPr>
             <a:endParaRPr lang="en-US" dirty="0"/>
-          </a:p>
-          <a:p>
-            <a:pPr marL="0" indent="0">
-              <a:buNone/>
-            </a:pPr>
-            <a:r>
-              <a:rPr lang="en-US" dirty="0"/>
-              <a:t>Try the </a:t>
-            </a:r>
-            <a:r>
-              <a:rPr lang="en-US" dirty="0" err="1"/>
-              <a:t>dataframe</a:t>
-            </a:r>
-            <a:r>
-              <a:rPr lang="en-US" dirty="0"/>
-              <a:t> version on the beaches dataset, then use summary() to see if the missing datapoints are gone. </a:t>
-            </a:r>
-          </a:p>
-          <a:p>
-            <a:pPr marL="0" indent="0">
-              <a:buNone/>
-            </a:pPr>
-            <a:endParaRPr lang="en-US" dirty="0"/>
-          </a:p>
-          <a:p>
-            <a:pPr marL="0" indent="0">
-              <a:buNone/>
-            </a:pPr>
-            <a:r>
-              <a:rPr lang="en-US" dirty="0"/>
-              <a:t>MICE package can also do imputation (NA replacement) very easily, lots of examples online on how to do these in very robust ways. </a:t>
-            </a:r>
           </a:p>
         </p:txBody>
       </p:sp>
@@ -22157,23 +22076,36 @@
               <a:t> The function we will be using throughout the course will be the </a:t>
             </a:r>
             <a:r>
-              <a:rPr lang="en-US" b="1" dirty="0" err="1"/>
-              <a:t>createDataPartition</a:t>
-            </a:r>
-            <a:r>
-              <a:rPr lang="en-US" b="1" dirty="0"/>
-              <a:t>() </a:t>
+              <a:rPr lang="en-US" b="0" dirty="0" err="1">
+                <a:solidFill>
+                  <a:srgbClr val="C6C6C6"/>
+                </a:solidFill>
+                <a:effectLst/>
+                <a:latin typeface="Consolas" panose="020B0609020204030204" pitchFamily="49" charset="0"/>
+              </a:rPr>
+              <a:t>train_test_split</a:t>
+            </a:r>
+            <a:r>
+              <a:rPr lang="en-US" b="0" dirty="0">
+                <a:solidFill>
+                  <a:srgbClr val="C6C6C6"/>
+                </a:solidFill>
+                <a:effectLst/>
+                <a:latin typeface="Consolas" panose="020B0609020204030204" pitchFamily="49" charset="0"/>
+              </a:rPr>
+              <a:t> </a:t>
             </a:r>
             <a:r>
               <a:rPr lang="en-US" dirty="0"/>
-              <a:t>function in the caret package. </a:t>
-            </a:r>
-          </a:p>
-          <a:p>
-            <a:pPr lvl="1"/>
+              <a:t>function in the </a:t>
+            </a:r>
+            <a:r>
+              <a:rPr lang="en-US" dirty="0" err="1"/>
+              <a:t>sklearn</a:t>
+            </a:r>
             <a:r>
               <a:rPr lang="en-US" dirty="0"/>
-              <a:t> The problem is that it’s not great at creating multiple partition, so we essentially use it twice to create a sample, then a sample of a sample. </a:t>
+              <a:t> package. </a:t>
             </a:r>
           </a:p>
           <a:p>

</xml_diff>